<commit_message>
added logo to powerpoint
</commit_message>
<xml_diff>
--- a/DataBridgePresentation.pptx
+++ b/DataBridgePresentation.pptx
@@ -115,7 +115,7 @@
   </p:defaultTextStyle>
   <p:extLst>
     <p:ext uri="{EFAFB233-063F-42B5-8137-9DF3F51BA10A}">
-      <p15:sldGuideLst xmlns:p15="http://schemas.microsoft.com/office/powerpoint/2012/main" xmlns="">
+      <p15:sldGuideLst xmlns:p15="http://schemas.microsoft.com/office/powerpoint/2012/main">
         <p15:guide id="1" orient="horz" pos="2160">
           <p15:clr>
             <a:srgbClr val="A4A3A4"/>
@@ -3791,7 +3791,7 @@
     </p:spTree>
     <p:extLst>
       <p:ext uri="{BB962C8B-B14F-4D97-AF65-F5344CB8AC3E}">
-        <p14:creationId xmlns:p14="http://schemas.microsoft.com/office/powerpoint/2010/main" xmlns="" val="2018534654"/>
+        <p14:creationId xmlns:p14="http://schemas.microsoft.com/office/powerpoint/2010/main" val="2018534654"/>
       </p:ext>
     </p:extLst>
   </p:cSld>
@@ -3870,7 +3870,7 @@
     </p:spTree>
     <p:extLst>
       <p:ext uri="{BB962C8B-B14F-4D97-AF65-F5344CB8AC3E}">
-        <p14:creationId xmlns:p14="http://schemas.microsoft.com/office/powerpoint/2010/main" xmlns="" val="2655071220"/>
+        <p14:creationId xmlns:p14="http://schemas.microsoft.com/office/powerpoint/2010/main" val="2655071220"/>
       </p:ext>
     </p:extLst>
   </p:cSld>
@@ -3970,10 +3970,40 @@
           </a:p>
         </p:txBody>
       </p:sp>
+      <p:pic>
+        <p:nvPicPr>
+          <p:cNvPr id="4" name="Picture 3"/>
+          <p:cNvPicPr>
+            <a:picLocks noChangeAspect="1"/>
+          </p:cNvPicPr>
+          <p:nvPr/>
+        </p:nvPicPr>
+        <p:blipFill>
+          <a:blip r:embed="rId2">
+            <a:extLst>
+              <a:ext uri="{28A0092B-C50C-407E-A947-70E740481C1C}">
+                <a14:useLocalDpi xmlns:a14="http://schemas.microsoft.com/office/drawing/2010/main" val="0"/>
+              </a:ext>
+            </a:extLst>
+          </a:blip>
+          <a:stretch>
+            <a:fillRect/>
+          </a:stretch>
+        </p:blipFill>
+        <p:spPr>
+          <a:xfrm>
+            <a:off x="7877532" y="3527796"/>
+            <a:ext cx="3810532" cy="2467319"/>
+          </a:xfrm>
+          <a:prstGeom prst="rect">
+            <a:avLst/>
+          </a:prstGeom>
+        </p:spPr>
+      </p:pic>
     </p:spTree>
     <p:extLst>
       <p:ext uri="{BB962C8B-B14F-4D97-AF65-F5344CB8AC3E}">
-        <p14:creationId xmlns:p14="http://schemas.microsoft.com/office/powerpoint/2010/main" xmlns="" val="1346543847"/>
+        <p14:creationId xmlns:p14="http://schemas.microsoft.com/office/powerpoint/2010/main" val="1346543847"/>
       </p:ext>
     </p:extLst>
   </p:cSld>
@@ -4082,7 +4112,7 @@
     </p:spTree>
     <p:extLst>
       <p:ext uri="{BB962C8B-B14F-4D97-AF65-F5344CB8AC3E}">
-        <p14:creationId xmlns:p14="http://schemas.microsoft.com/office/powerpoint/2010/main" xmlns="" val="4198086196"/>
+        <p14:creationId xmlns:p14="http://schemas.microsoft.com/office/powerpoint/2010/main" val="4198086196"/>
       </p:ext>
     </p:extLst>
   </p:cSld>
@@ -4176,7 +4206,7 @@
           <a:blip r:embed="rId2" cstate="print">
             <a:extLst>
               <a:ext uri="{28A0092B-C50C-407E-A947-70E740481C1C}">
-                <a14:useLocalDpi xmlns:a14="http://schemas.microsoft.com/office/drawing/2010/main" xmlns="" val="0"/>
+                <a14:useLocalDpi xmlns:a14="http://schemas.microsoft.com/office/drawing/2010/main" val="0"/>
               </a:ext>
             </a:extLst>
           </a:blip>
@@ -4194,7 +4224,7 @@
     </p:spTree>
     <p:extLst>
       <p:ext uri="{BB962C8B-B14F-4D97-AF65-F5344CB8AC3E}">
-        <p14:creationId xmlns:p14="http://schemas.microsoft.com/office/powerpoint/2010/main" xmlns="" val="1150150330"/>
+        <p14:creationId xmlns:p14="http://schemas.microsoft.com/office/powerpoint/2010/main" val="1150150330"/>
       </p:ext>
     </p:extLst>
   </p:cSld>
@@ -4295,7 +4325,7 @@
           <a:blip r:embed="rId2" cstate="print">
             <a:extLst>
               <a:ext uri="{28A0092B-C50C-407E-A947-70E740481C1C}">
-                <a14:useLocalDpi xmlns:a14="http://schemas.microsoft.com/office/drawing/2010/main" xmlns="" val="0"/>
+                <a14:useLocalDpi xmlns:a14="http://schemas.microsoft.com/office/drawing/2010/main" val="0"/>
               </a:ext>
             </a:extLst>
           </a:blip>
@@ -4337,7 +4367,7 @@
     </p:spTree>
     <p:extLst>
       <p:ext uri="{BB962C8B-B14F-4D97-AF65-F5344CB8AC3E}">
-        <p14:creationId xmlns:p14="http://schemas.microsoft.com/office/powerpoint/2010/main" xmlns="" val="2750992887"/>
+        <p14:creationId xmlns:p14="http://schemas.microsoft.com/office/powerpoint/2010/main" val="2750992887"/>
       </p:ext>
     </p:extLst>
   </p:cSld>
@@ -4431,7 +4461,7 @@
           <a:blip r:embed="rId2" cstate="print">
             <a:extLst>
               <a:ext uri="{28A0092B-C50C-407E-A947-70E740481C1C}">
-                <a14:useLocalDpi xmlns:a14="http://schemas.microsoft.com/office/drawing/2010/main" xmlns="" val="0"/>
+                <a14:useLocalDpi xmlns:a14="http://schemas.microsoft.com/office/drawing/2010/main" val="0"/>
               </a:ext>
             </a:extLst>
           </a:blip>
@@ -4473,7 +4503,7 @@
     </p:spTree>
     <p:extLst>
       <p:ext uri="{BB962C8B-B14F-4D97-AF65-F5344CB8AC3E}">
-        <p14:creationId xmlns:p14="http://schemas.microsoft.com/office/powerpoint/2010/main" xmlns="" val="2132250628"/>
+        <p14:creationId xmlns:p14="http://schemas.microsoft.com/office/powerpoint/2010/main" val="2132250628"/>
       </p:ext>
     </p:extLst>
   </p:cSld>
@@ -4588,7 +4618,7 @@
           <a:blip r:embed="rId2" cstate="print">
             <a:extLst>
               <a:ext uri="{28A0092B-C50C-407E-A947-70E740481C1C}">
-                <a14:useLocalDpi xmlns:a14="http://schemas.microsoft.com/office/drawing/2010/main" xmlns="" val="0"/>
+                <a14:useLocalDpi xmlns:a14="http://schemas.microsoft.com/office/drawing/2010/main" val="0"/>
               </a:ext>
             </a:extLst>
           </a:blip>
@@ -4606,7 +4636,7 @@
     </p:spTree>
     <p:extLst>
       <p:ext uri="{BB962C8B-B14F-4D97-AF65-F5344CB8AC3E}">
-        <p14:creationId xmlns:p14="http://schemas.microsoft.com/office/powerpoint/2010/main" xmlns="" val="1567769392"/>
+        <p14:creationId xmlns:p14="http://schemas.microsoft.com/office/powerpoint/2010/main" val="1567769392"/>
       </p:ext>
     </p:extLst>
   </p:cSld>

</xml_diff>

<commit_message>
added logo and put source in powerpoint
</commit_message>
<xml_diff>
--- a/DataBridgePresentation.pptx
+++ b/DataBridgePresentation.pptx
@@ -15,6 +15,7 @@
     <p:sldId id="263" r:id="rId9"/>
     <p:sldId id="264" r:id="rId10"/>
     <p:sldId id="265" r:id="rId11"/>
+    <p:sldId id="266" r:id="rId12"/>
   </p:sldIdLst>
   <p:sldSz cx="12192000" cy="6858000"/>
   <p:notesSz cx="6858000" cy="9144000"/>
@@ -3880,6 +3881,89 @@
 </p:sld>
 </file>
 
+<file path=ppt/slides/slide11.xml><?xml version="1.0" encoding="utf-8"?>
+<p:sld xmlns:a="http://schemas.openxmlformats.org/drawingml/2006/main" xmlns:r="http://schemas.openxmlformats.org/officeDocument/2006/relationships" xmlns:p="http://schemas.openxmlformats.org/presentationml/2006/main">
+  <p:cSld>
+    <p:spTree>
+      <p:nvGrpSpPr>
+        <p:cNvPr id="1" name=""/>
+        <p:cNvGrpSpPr/>
+        <p:nvPr/>
+      </p:nvGrpSpPr>
+      <p:grpSpPr>
+        <a:xfrm>
+          <a:off x="0" y="0"/>
+          <a:ext cx="0" cy="0"/>
+          <a:chOff x="0" y="0"/>
+          <a:chExt cx="0" cy="0"/>
+        </a:xfrm>
+      </p:grpSpPr>
+      <p:sp>
+        <p:nvSpPr>
+          <p:cNvPr id="2" name="Title 1"/>
+          <p:cNvSpPr>
+            <a:spLocks noGrp="1"/>
+          </p:cNvSpPr>
+          <p:nvPr>
+            <p:ph type="title"/>
+          </p:nvPr>
+        </p:nvSpPr>
+        <p:spPr/>
+        <p:txBody>
+          <a:bodyPr/>
+          <a:lstStyle/>
+          <a:p>
+            <a:r>
+              <a:rPr lang="en-US" dirty="0" smtClean="0"/>
+              <a:t>Source</a:t>
+            </a:r>
+            <a:endParaRPr lang="en-US" dirty="0"/>
+          </a:p>
+        </p:txBody>
+      </p:sp>
+      <p:sp>
+        <p:nvSpPr>
+          <p:cNvPr id="3" name="Content Placeholder 2"/>
+          <p:cNvSpPr>
+            <a:spLocks noGrp="1"/>
+          </p:cNvSpPr>
+          <p:nvPr>
+            <p:ph sz="quarter" idx="1"/>
+          </p:nvPr>
+        </p:nvSpPr>
+        <p:spPr/>
+        <p:txBody>
+          <a:bodyPr/>
+          <a:lstStyle/>
+          <a:p>
+            <a:r>
+              <a:rPr lang="en-US" smtClean="0"/>
+              <a:t>Image:</a:t>
+            </a:r>
+            <a:endParaRPr lang="en-US" dirty="0" smtClean="0"/>
+          </a:p>
+          <a:p>
+            <a:pPr lvl="1"/>
+            <a:r>
+              <a:rPr lang="en-US" dirty="0"/>
+              <a:t>http://38ccda.medialib.glogster.com/media/ac57b46d05ee61023f6c297d44aaea9349af2f721b70e868bf78fda40a49fbb3/cartoon-bridge.jpg</a:t>
+            </a:r>
+          </a:p>
+        </p:txBody>
+      </p:sp>
+    </p:spTree>
+    <p:extLst>
+      <p:ext uri="{BB962C8B-B14F-4D97-AF65-F5344CB8AC3E}">
+        <p14:creationId xmlns:p14="http://schemas.microsoft.com/office/powerpoint/2010/main" val="2748530241"/>
+      </p:ext>
+    </p:extLst>
+  </p:cSld>
+  <p:clrMapOvr>
+    <a:masterClrMapping/>
+  </p:clrMapOvr>
+</p:sld>
+</file>
+
 <file path=ppt/slides/slide2.xml><?xml version="1.0" encoding="utf-8"?>
 <p:sld xmlns:a="http://schemas.openxmlformats.org/drawingml/2006/main" xmlns:r="http://schemas.openxmlformats.org/officeDocument/2006/relationships" xmlns:p="http://schemas.openxmlformats.org/presentationml/2006/main">
   <p:cSld>

</xml_diff>